<commit_message>
Updates to application info from Summer@Highland application
</commit_message>
<xml_diff>
--- a/presentations/10-slide-pitch/initial-10-slide-pitch.pptx
+++ b/presentations/10-slide-pitch/initial-10-slide-pitch.pptx
@@ -426,12 +426,12 @@
         </c:dLbls>
         <c:gapWidth val="150"/>
         <c:shape val="box"/>
-        <c:axId val="2117576408"/>
-        <c:axId val="2117714568"/>
-        <c:axId val="2117389928"/>
+        <c:axId val="2087539176"/>
+        <c:axId val="2087544856"/>
+        <c:axId val="2087550312"/>
       </c:bar3DChart>
       <c:catAx>
-        <c:axId val="2117576408"/>
+        <c:axId val="2087539176"/>
         <c:scaling>
           <c:orientation val="minMax"/>
         </c:scaling>
@@ -471,7 +471,7 @@
             <a:endParaRPr lang="en-US"/>
           </a:p>
         </c:txPr>
-        <c:crossAx val="2117714568"/>
+        <c:crossAx val="2087544856"/>
         <c:crosses val="autoZero"/>
         <c:auto val="1"/>
         <c:lblAlgn val="ctr"/>
@@ -479,7 +479,7 @@
         <c:noMultiLvlLbl val="0"/>
       </c:catAx>
       <c:valAx>
-        <c:axId val="2117714568"/>
+        <c:axId val="2087544856"/>
         <c:scaling>
           <c:orientation val="minMax"/>
         </c:scaling>
@@ -519,12 +519,12 @@
             <a:endParaRPr lang="en-US"/>
           </a:p>
         </c:txPr>
-        <c:crossAx val="2117576408"/>
+        <c:crossAx val="2087539176"/>
         <c:crosses val="autoZero"/>
         <c:crossBetween val="between"/>
       </c:valAx>
       <c:serAx>
-        <c:axId val="2117389928"/>
+        <c:axId val="2087550312"/>
         <c:scaling>
           <c:orientation val="minMax"/>
         </c:scaling>
@@ -533,7 +533,7 @@
         <c:majorTickMark val="out"/>
         <c:minorTickMark val="none"/>
         <c:tickLblPos val="nextTo"/>
-        <c:crossAx val="2117714568"/>
+        <c:crossAx val="2087544856"/>
         <c:crosses val="autoZero"/>
       </c:serAx>
     </c:plotArea>
@@ -741,7 +741,7 @@
           <a:p>
             <a:fld id="{365CA2CA-CD65-4142-8343-1AFCEEA668AB}" type="datetimeFigureOut">
               <a:rPr lang="en-US" smtClean="0"/>
-              <a:t>3/5/13</a:t>
+              <a:t>4/1/13</a:t>
             </a:fld>
             <a:endParaRPr lang="en-US"/>
           </a:p>
@@ -906,7 +906,7 @@
           <a:p>
             <a:fld id="{365CA2CA-CD65-4142-8343-1AFCEEA668AB}" type="datetimeFigureOut">
               <a:rPr lang="en-US" smtClean="0"/>
-              <a:t>3/5/13</a:t>
+              <a:t>4/1/13</a:t>
             </a:fld>
             <a:endParaRPr lang="en-US"/>
           </a:p>
@@ -1081,7 +1081,7 @@
           <a:p>
             <a:fld id="{365CA2CA-CD65-4142-8343-1AFCEEA668AB}" type="datetimeFigureOut">
               <a:rPr lang="en-US" smtClean="0"/>
-              <a:t>3/5/13</a:t>
+              <a:t>4/1/13</a:t>
             </a:fld>
             <a:endParaRPr lang="en-US"/>
           </a:p>
@@ -1246,7 +1246,7 @@
           <a:p>
             <a:fld id="{365CA2CA-CD65-4142-8343-1AFCEEA668AB}" type="datetimeFigureOut">
               <a:rPr lang="en-US" smtClean="0"/>
-              <a:t>3/5/13</a:t>
+              <a:t>4/1/13</a:t>
             </a:fld>
             <a:endParaRPr lang="en-US"/>
           </a:p>
@@ -1487,7 +1487,7 @@
           <a:p>
             <a:fld id="{365CA2CA-CD65-4142-8343-1AFCEEA668AB}" type="datetimeFigureOut">
               <a:rPr lang="en-US" smtClean="0"/>
-              <a:t>3/5/13</a:t>
+              <a:t>4/1/13</a:t>
             </a:fld>
             <a:endParaRPr lang="en-US"/>
           </a:p>
@@ -1770,7 +1770,7 @@
           <a:p>
             <a:fld id="{365CA2CA-CD65-4142-8343-1AFCEEA668AB}" type="datetimeFigureOut">
               <a:rPr lang="en-US" smtClean="0"/>
-              <a:t>3/5/13</a:t>
+              <a:t>4/1/13</a:t>
             </a:fld>
             <a:endParaRPr lang="en-US"/>
           </a:p>
@@ -2187,7 +2187,7 @@
           <a:p>
             <a:fld id="{365CA2CA-CD65-4142-8343-1AFCEEA668AB}" type="datetimeFigureOut">
               <a:rPr lang="en-US" smtClean="0"/>
-              <a:t>3/5/13</a:t>
+              <a:t>4/1/13</a:t>
             </a:fld>
             <a:endParaRPr lang="en-US"/>
           </a:p>
@@ -2300,7 +2300,7 @@
           <a:p>
             <a:fld id="{365CA2CA-CD65-4142-8343-1AFCEEA668AB}" type="datetimeFigureOut">
               <a:rPr lang="en-US" smtClean="0"/>
-              <a:t>3/5/13</a:t>
+              <a:t>4/1/13</a:t>
             </a:fld>
             <a:endParaRPr lang="en-US"/>
           </a:p>
@@ -2390,7 +2390,7 @@
           <a:p>
             <a:fld id="{365CA2CA-CD65-4142-8343-1AFCEEA668AB}" type="datetimeFigureOut">
               <a:rPr lang="en-US" smtClean="0"/>
-              <a:t>3/5/13</a:t>
+              <a:t>4/1/13</a:t>
             </a:fld>
             <a:endParaRPr lang="en-US"/>
           </a:p>
@@ -2662,7 +2662,7 @@
           <a:p>
             <a:fld id="{365CA2CA-CD65-4142-8343-1AFCEEA668AB}" type="datetimeFigureOut">
               <a:rPr lang="en-US" smtClean="0"/>
-              <a:t>3/5/13</a:t>
+              <a:t>4/1/13</a:t>
             </a:fld>
             <a:endParaRPr lang="en-US"/>
           </a:p>
@@ -2910,7 +2910,7 @@
           <a:p>
             <a:fld id="{365CA2CA-CD65-4142-8343-1AFCEEA668AB}" type="datetimeFigureOut">
               <a:rPr lang="en-US" smtClean="0"/>
-              <a:t>3/5/13</a:t>
+              <a:t>4/1/13</a:t>
             </a:fld>
             <a:endParaRPr lang="en-US"/>
           </a:p>
@@ -3118,7 +3118,7 @@
           <a:p>
             <a:fld id="{365CA2CA-CD65-4142-8343-1AFCEEA668AB}" type="datetimeFigureOut">
               <a:rPr lang="en-US" smtClean="0"/>
-              <a:t>3/5/13</a:t>
+              <a:t>4/1/13</a:t>
             </a:fld>
             <a:endParaRPr lang="en-US"/>
           </a:p>
@@ -3521,7 +3521,12 @@
             <p:ph type="subTitle" idx="1"/>
           </p:nvPr>
         </p:nvSpPr>
-        <p:spPr/>
+        <p:spPr>
+          <a:xfrm>
+            <a:off x="1090705" y="3886200"/>
+            <a:ext cx="6980518" cy="1752600"/>
+          </a:xfrm>
+        </p:spPr>
         <p:txBody>
           <a:bodyPr/>
           <a:lstStyle/>
@@ -3601,7 +3606,9 @@
         </p:nvSpPr>
         <p:spPr/>
         <p:txBody>
-          <a:bodyPr/>
+          <a:bodyPr>
+            <a:normAutofit/>
+          </a:bodyPr>
           <a:lstStyle/>
           <a:p>
             <a:r>
@@ -3612,15 +3619,20 @@
           <a:p>
             <a:r>
               <a:rPr lang="en-US" dirty="0" smtClean="0"/>
-              <a:t>Explore algorithmic methods for combining multiple scanning methods and reducing error</a:t>
-            </a:r>
+              <a:t>Validate viability of low-cost projection alternatives</a:t>
+            </a:r>
+            <a:endParaRPr lang="en-US" dirty="0" smtClean="0"/>
           </a:p>
           <a:p>
             <a:r>
               <a:rPr lang="en-US" dirty="0" smtClean="0"/>
-              <a:t>Forward-facing software development to allow for various input devices (allows rapid modification during prototyping and future additions)</a:t>
-            </a:r>
-            <a:endParaRPr lang="en-US" dirty="0"/>
+              <a:t>Explore algorithmic methods for combining multiple scanning methods and reducing </a:t>
+            </a:r>
+            <a:r>
+              <a:rPr lang="en-US" dirty="0" smtClean="0"/>
+              <a:t>error</a:t>
+            </a:r>
+            <a:endParaRPr lang="en-US" dirty="0" smtClean="0"/>
           </a:p>
         </p:txBody>
       </p:sp>
@@ -3704,15 +3716,7 @@
             <a:pPr marL="457200"/>
             <a:r>
               <a:rPr lang="en-US" sz="2000" dirty="0" smtClean="0"/>
-              <a:t>All </a:t>
-            </a:r>
-            <a:r>
-              <a:rPr lang="en-US" sz="2000" dirty="0" smtClean="0"/>
-              <a:t>work in </a:t>
-            </a:r>
-            <a:r>
-              <a:rPr lang="en-US" sz="2000" dirty="0" smtClean="0"/>
-              <a:t>measurement, design, art, and manufacturing will soon take advantage of the accuracy and speed of 3D scanning.</a:t>
+              <a:t>All work in measurement, design, art, and manufacturing will soon take advantage of the accuracy and speed of 3D scanning.</a:t>
             </a:r>
             <a:br>
               <a:rPr lang="en-US" sz="2000" dirty="0" smtClean="0"/>
@@ -3842,11 +3846,7 @@
           <a:p>
             <a:r>
               <a:rPr lang="en-US" dirty="0" smtClean="0"/>
-              <a:t>Potential </a:t>
-            </a:r>
-            <a:r>
-              <a:rPr lang="en-US" dirty="0" smtClean="0"/>
-              <a:t>users</a:t>
+              <a:t>Potential users</a:t>
             </a:r>
           </a:p>
           <a:p>
@@ -3887,35 +3887,23 @@
           <a:p>
             <a:r>
               <a:rPr lang="en-US" dirty="0" smtClean="0"/>
-              <a:t>Interest </a:t>
+              <a:t>Interest in and use </a:t>
             </a:r>
             <a:r>
               <a:rPr lang="en-US" dirty="0" smtClean="0"/>
-              <a:t>in and use </a:t>
+              <a:t>of 3D printing </a:t>
             </a:r>
             <a:r>
               <a:rPr lang="en-US" dirty="0" smtClean="0"/>
-              <a:t>in </a:t>
+              <a:t>is growing wildly.  3D scanning is the </a:t>
             </a:r>
             <a:r>
               <a:rPr lang="en-US" dirty="0" smtClean="0"/>
-              <a:t>3D </a:t>
+              <a:t>second half of this </a:t>
             </a:r>
             <a:r>
               <a:rPr lang="en-US" dirty="0" smtClean="0"/>
-              <a:t>of printing </a:t>
-            </a:r>
-            <a:r>
-              <a:rPr lang="en-US" dirty="0" smtClean="0"/>
-              <a:t>is </a:t>
-            </a:r>
-            <a:r>
-              <a:rPr lang="en-US" dirty="0" smtClean="0"/>
-              <a:t>growing wildly</a:t>
-            </a:r>
-            <a:r>
-              <a:rPr lang="en-US" dirty="0" smtClean="0"/>
-              <a:t>.  3D scanning is the other part of this revolution</a:t>
+              <a:t>revolution</a:t>
             </a:r>
           </a:p>
           <a:p>
@@ -4053,11 +4041,7 @@
           <a:p>
             <a:r>
               <a:rPr lang="en-US" dirty="0" smtClean="0"/>
-              <a:t>Relevant </a:t>
-            </a:r>
-            <a:r>
-              <a:rPr lang="en-US" dirty="0" smtClean="0"/>
-              <a:t>Technology Advances</a:t>
+              <a:t>Relevant Technology Advances</a:t>
             </a:r>
             <a:endParaRPr lang="en-US" dirty="0"/>
           </a:p>
@@ -4090,11 +4074,7 @@
             <a:pPr lvl="1"/>
             <a:r>
               <a:rPr lang="en-US" dirty="0" smtClean="0"/>
-              <a:t> </a:t>
-            </a:r>
-            <a:r>
-              <a:rPr lang="en-US" dirty="0" smtClean="0"/>
-              <a:t>Notably emergence of high-quality, compact, and cheap cell phone cameras</a:t>
+              <a:t> Notably emergence of high-quality, compact, and cheap cell phone cameras</a:t>
             </a:r>
           </a:p>
           <a:p>
@@ -4106,17 +4086,12 @@
               <a:rPr lang="en-US" dirty="0" smtClean="0"/>
               <a:t> </a:t>
             </a:r>
-            <a:endParaRPr lang="en-US" dirty="0" smtClean="0"/>
           </a:p>
           <a:p>
             <a:pPr lvl="1"/>
             <a:r>
               <a:rPr lang="en-US" dirty="0" smtClean="0"/>
-              <a:t>High</a:t>
-            </a:r>
-            <a:r>
-              <a:rPr lang="en-US" dirty="0" smtClean="0"/>
-              <a:t>-power computers are practically ubiquitous</a:t>
+              <a:t>High-power computers are practically ubiquitous</a:t>
             </a:r>
           </a:p>
           <a:p>
@@ -4129,11 +4104,7 @@
             <a:pPr lvl="1"/>
             <a:r>
               <a:rPr lang="en-US" dirty="0" smtClean="0"/>
-              <a:t>High</a:t>
-            </a:r>
-            <a:r>
-              <a:rPr lang="en-US" dirty="0" smtClean="0"/>
-              <a:t>-precision laser cutting and CNC machining is now easily attainable</a:t>
+              <a:t>High-precision laser cutting and CNC machining is now easily attainable</a:t>
             </a:r>
           </a:p>
           <a:p>
@@ -4587,7 +4558,7 @@
         <p:spPr/>
         <p:txBody>
           <a:bodyPr>
-            <a:normAutofit fontScale="85000" lnSpcReduction="20000"/>
+            <a:normAutofit/>
           </a:bodyPr>
           <a:lstStyle/>
           <a:p>
@@ -4638,11 +4609,7 @@
             </a:r>
             <a:r>
               <a:rPr lang="en-US" sz="2118" dirty="0" smtClean="0"/>
-              <a:t>ntuitive </a:t>
-            </a:r>
-            <a:r>
-              <a:rPr lang="en-US" sz="2118" dirty="0" smtClean="0"/>
-              <a:t>website and software UI</a:t>
+              <a:t>ntuitive website and software UI</a:t>
             </a:r>
           </a:p>
           <a:p>
@@ -4653,55 +4620,13 @@
             </a:r>
             <a:r>
               <a:rPr lang="en-US" sz="2118" dirty="0" smtClean="0"/>
-              <a:t>omputer</a:t>
+              <a:t>omputer-controlled </a:t>
             </a:r>
             <a:r>
               <a:rPr lang="en-US" sz="2118" dirty="0" smtClean="0"/>
-              <a:t>-controlled calibration</a:t>
-            </a:r>
-          </a:p>
-          <a:p>
-            <a:r>
-              <a:rPr lang="en-US" b="1" dirty="0" smtClean="0"/>
-              <a:t>Modular</a:t>
-            </a:r>
-          </a:p>
-          <a:p>
-            <a:pPr lvl="1"/>
-            <a:r>
-              <a:rPr lang="en-US" sz="2118" dirty="0"/>
-              <a:t>E</a:t>
-            </a:r>
-            <a:r>
-              <a:rPr lang="en-US" sz="2118" dirty="0" smtClean="0"/>
-              <a:t>asily </a:t>
-            </a:r>
-            <a:r>
-              <a:rPr lang="en-US" sz="2118" dirty="0" smtClean="0"/>
-              <a:t>alter the workspace</a:t>
-            </a:r>
-          </a:p>
-          <a:p>
-            <a:pPr lvl="1"/>
-            <a:r>
-              <a:rPr lang="en-US" sz="2118" dirty="0" smtClean="0"/>
-              <a:t>Enables scanning a single face of large objects, all faces of a small object, or </a:t>
-            </a:r>
-            <a:r>
-              <a:rPr lang="en-US" sz="2118" dirty="0" smtClean="0"/>
-              <a:t>even an </a:t>
-            </a:r>
-            <a:r>
-              <a:rPr lang="en-US" sz="2118" dirty="0" smtClean="0"/>
-              <a:t>entire room with one system</a:t>
-            </a:r>
-          </a:p>
-          <a:p>
-            <a:pPr lvl="1"/>
-            <a:r>
-              <a:rPr lang="en-US" sz="2118" dirty="0" smtClean="0"/>
-              <a:t>Allows easy upgrading, maintenance, and expansion</a:t>
-            </a:r>
+              <a:t>calibration</a:t>
+            </a:r>
+            <a:endParaRPr lang="en-US" sz="2118" dirty="0" smtClean="0"/>
           </a:p>
           <a:p>
             <a:r>
@@ -4771,60 +4696,6 @@
           </a:p>
         </p:txBody>
       </p:sp>
-      <p:pic>
-        <p:nvPicPr>
-          <p:cNvPr id="7" name="Picture 6" descr="me.jpg"/>
-          <p:cNvPicPr>
-            <a:picLocks noChangeAspect="1"/>
-          </p:cNvPicPr>
-          <p:nvPr/>
-        </p:nvPicPr>
-        <p:blipFill>
-          <a:blip r:embed="rId2"/>
-          <a:stretch>
-            <a:fillRect/>
-          </a:stretch>
-        </p:blipFill>
-        <p:spPr>
-          <a:xfrm>
-            <a:off x="4700248" y="4449936"/>
-            <a:ext cx="1295169" cy="1295169"/>
-          </a:xfrm>
-          <a:prstGeom prst="rect">
-            <a:avLst/>
-          </a:prstGeom>
-          <a:solidFill>
-            <a:srgbClr val="FFFFFF">
-              <a:shade val="85000"/>
-            </a:srgbClr>
-          </a:solidFill>
-          <a:ln w="88900" cap="sq">
-            <a:solidFill>
-              <a:srgbClr val="FFFFFF"/>
-            </a:solidFill>
-            <a:miter lim="800000"/>
-          </a:ln>
-          <a:effectLst>
-            <a:outerShdw blurRad="55000" dist="18000" dir="5400000" algn="tl" rotWithShape="0">
-              <a:srgbClr val="000000">
-                <a:alpha val="40000"/>
-              </a:srgbClr>
-            </a:outerShdw>
-          </a:effectLst>
-          <a:scene3d>
-            <a:camera prst="orthographicFront"/>
-            <a:lightRig rig="twoPt" dir="t">
-              <a:rot lat="0" lon="0" rev="7200000"/>
-            </a:lightRig>
-          </a:scene3d>
-          <a:sp3d>
-            <a:bevelT w="25400" h="19050"/>
-            <a:contourClr>
-              <a:srgbClr val="FFFFFF"/>
-            </a:contourClr>
-          </a:sp3d>
-        </p:spPr>
-      </p:pic>
       <p:sp>
         <p:nvSpPr>
           <p:cNvPr id="8" name="TextBox 7"/>
@@ -4833,7 +4704,7 @@
         </p:nvSpPr>
         <p:spPr>
           <a:xfrm>
-            <a:off x="1964196" y="2022582"/>
+            <a:off x="2871055" y="1783523"/>
             <a:ext cx="2383578" cy="1231106"/>
           </a:xfrm>
           <a:prstGeom prst="rect">
@@ -4903,7 +4774,7 @@
         </p:nvSpPr>
         <p:spPr>
           <a:xfrm>
-            <a:off x="1964196" y="4513999"/>
+            <a:off x="2873137" y="5048840"/>
             <a:ext cx="2383578" cy="1231106"/>
           </a:xfrm>
           <a:prstGeom prst="rect">
@@ -4963,7 +4834,7 @@
         </p:nvSpPr>
         <p:spPr>
           <a:xfrm>
-            <a:off x="6121369" y="2022582"/>
+            <a:off x="5961795" y="3309911"/>
             <a:ext cx="2383578" cy="1231106"/>
           </a:xfrm>
           <a:prstGeom prst="rect">
@@ -5010,66 +4881,6 @@
             <a:r>
               <a:rPr lang="en-US" sz="1400" dirty="0" smtClean="0"/>
               <a:t> Mechanical &amp; Electrical Engineering</a:t>
-            </a:r>
-            <a:endParaRPr lang="en-US" sz="1400" dirty="0"/>
-          </a:p>
-        </p:txBody>
-      </p:sp>
-      <p:sp>
-        <p:nvSpPr>
-          <p:cNvPr id="11" name="TextBox 10"/>
-          <p:cNvSpPr txBox="1"/>
-          <p:nvPr/>
-        </p:nvSpPr>
-        <p:spPr>
-          <a:xfrm>
-            <a:off x="6273769" y="4513999"/>
-            <a:ext cx="2383578" cy="1015663"/>
-          </a:xfrm>
-          <a:prstGeom prst="rect">
-            <a:avLst/>
-          </a:prstGeom>
-          <a:noFill/>
-        </p:spPr>
-        <p:txBody>
-          <a:bodyPr wrap="square" rtlCol="0">
-            <a:spAutoFit/>
-          </a:bodyPr>
-          <a:lstStyle/>
-          <a:p>
-            <a:r>
-              <a:rPr lang="en-US" dirty="0" smtClean="0"/>
-              <a:t>Turner Bohlen</a:t>
-            </a:r>
-          </a:p>
-          <a:p>
-            <a:r>
-              <a:rPr lang="en-US" sz="1400" b="1" dirty="0" smtClean="0"/>
-              <a:t>Year:</a:t>
-            </a:r>
-            <a:r>
-              <a:rPr lang="en-US" sz="1400" dirty="0" smtClean="0"/>
-              <a:t> 2014</a:t>
-            </a:r>
-          </a:p>
-          <a:p>
-            <a:r>
-              <a:rPr lang="en-US" sz="1400" b="1" dirty="0" smtClean="0"/>
-              <a:t>Major:</a:t>
-            </a:r>
-            <a:r>
-              <a:rPr lang="en-US" sz="1400" dirty="0" smtClean="0"/>
-              <a:t> Physics</a:t>
-            </a:r>
-          </a:p>
-          <a:p>
-            <a:r>
-              <a:rPr lang="en-US" sz="1400" b="1" dirty="0" smtClean="0"/>
-              <a:t>Job:</a:t>
-            </a:r>
-            <a:r>
-              <a:rPr lang="en-US" sz="1400" dirty="0" smtClean="0"/>
-              <a:t> Programming</a:t>
             </a:r>
             <a:endParaRPr lang="en-US" sz="1400" dirty="0"/>
           </a:p>
@@ -5084,7 +4895,7 @@
           <p:nvPr/>
         </p:nvPicPr>
         <p:blipFill rotWithShape="1">
-          <a:blip r:embed="rId3">
+          <a:blip r:embed="rId2">
             <a:extLst>
               <a:ext uri="{28A0092B-C50C-407E-A947-70E740481C1C}">
                 <a14:useLocalDpi xmlns:a14="http://schemas.microsoft.com/office/drawing/2010/main" val="0"/>
@@ -5096,7 +4907,7 @@
         </p:blipFill>
         <p:spPr>
           <a:xfrm>
-            <a:off x="531718" y="4449936"/>
+            <a:off x="1440659" y="4984777"/>
             <a:ext cx="1293464" cy="1292128"/>
           </a:xfrm>
           <a:prstGeom prst="rect">
@@ -5143,14 +4954,14 @@
           <p:nvPr/>
         </p:nvPicPr>
         <p:blipFill>
-          <a:blip r:embed="rId4"/>
+          <a:blip r:embed="rId3"/>
           <a:stretch>
             <a:fillRect/>
           </a:stretch>
         </p:blipFill>
         <p:spPr>
           <a:xfrm>
-            <a:off x="531718" y="1979359"/>
+            <a:off x="1438577" y="1740300"/>
             <a:ext cx="1295546" cy="1295546"/>
           </a:xfrm>
           <a:prstGeom prst="rect">
@@ -5197,14 +5008,14 @@
           <p:nvPr/>
         </p:nvPicPr>
         <p:blipFill>
-          <a:blip r:embed="rId5"/>
+          <a:blip r:embed="rId4"/>
           <a:stretch>
             <a:fillRect/>
           </a:stretch>
         </p:blipFill>
         <p:spPr>
           <a:xfrm>
-            <a:off x="4700247" y="1952626"/>
+            <a:off x="4540673" y="3239955"/>
             <a:ext cx="1295169" cy="1322280"/>
           </a:xfrm>
           <a:prstGeom prst="rect">
@@ -5285,73 +5096,58 @@
         <p:spPr>
           <a:xfrm>
             <a:off x="457200" y="1600200"/>
-            <a:ext cx="4105729" cy="4525963"/>
+            <a:ext cx="7879976" cy="4525963"/>
           </a:xfrm>
         </p:spPr>
         <p:txBody>
           <a:bodyPr>
-            <a:normAutofit/>
+            <a:normAutofit fontScale="92500"/>
           </a:bodyPr>
           <a:lstStyle/>
           <a:p>
             <a:r>
               <a:rPr lang="en-US" dirty="0" smtClean="0"/>
-              <a:t>Ideas we want to explore:</a:t>
+              <a:t>Can successfully complete a scan using a DLP Projector </a:t>
+            </a:r>
+          </a:p>
+          <a:p>
+            <a:r>
+              <a:rPr lang="en-US" dirty="0" smtClean="0"/>
+              <a:t>Confident an array of cheap pinhole CMOS cameras can provide desired cost and accuracy</a:t>
+            </a:r>
+          </a:p>
+          <a:p>
+            <a:r>
+              <a:rPr lang="en-US" dirty="0" smtClean="0"/>
+              <a:t>DLP Projector is cost driver – low-cost alternatives to DLP Projection include:</a:t>
             </a:r>
           </a:p>
           <a:p>
             <a:pPr lvl="1"/>
             <a:r>
               <a:rPr lang="en-US" dirty="0" smtClean="0"/>
-              <a:t>Fixed and moving gratings over LEDs instead of projectors</a:t>
-            </a:r>
+              <a:t>Fixed </a:t>
+            </a:r>
+            <a:r>
+              <a:rPr lang="en-US" dirty="0" smtClean="0"/>
+              <a:t>and moving gratings over </a:t>
+            </a:r>
+            <a:r>
+              <a:rPr lang="en-US" dirty="0" smtClean="0"/>
+              <a:t>LEDs (Talbot imaging)</a:t>
+            </a:r>
+            <a:endParaRPr lang="en-US" dirty="0" smtClean="0"/>
           </a:p>
           <a:p>
             <a:pPr lvl="1"/>
             <a:r>
               <a:rPr lang="en-US" dirty="0" smtClean="0"/>
-              <a:t>Redundant arrays of cheap CMOS cameras</a:t>
-            </a:r>
+              <a:t>Optical interference fringes</a:t>
+            </a:r>
+            <a:endParaRPr lang="en-US" dirty="0" smtClean="0"/>
           </a:p>
           <a:p>
             <a:pPr lvl="1"/>
-            <a:r>
-              <a:rPr lang="en-US" dirty="0" smtClean="0"/>
-              <a:t>Merging multiple scanning techniques</a:t>
-            </a:r>
-          </a:p>
-          <a:p>
-            <a:pPr lvl="1"/>
-            <a:endParaRPr lang="en-US" dirty="0"/>
-          </a:p>
-        </p:txBody>
-      </p:sp>
-      <p:sp>
-        <p:nvSpPr>
-          <p:cNvPr id="5" name="TextBox 4"/>
-          <p:cNvSpPr txBox="1"/>
-          <p:nvPr/>
-        </p:nvSpPr>
-        <p:spPr>
-          <a:xfrm>
-            <a:off x="5872958" y="3668657"/>
-            <a:ext cx="1855947" cy="369332"/>
-          </a:xfrm>
-          <a:prstGeom prst="rect">
-            <a:avLst/>
-          </a:prstGeom>
-          <a:noFill/>
-        </p:spPr>
-        <p:txBody>
-          <a:bodyPr wrap="none" rtlCol="0">
-            <a:spAutoFit/>
-          </a:bodyPr>
-          <a:lstStyle/>
-          <a:p>
-            <a:r>
-              <a:rPr lang="en-US" dirty="0" smtClean="0"/>
-              <a:t>[CAD model here]</a:t>
-            </a:r>
             <a:endParaRPr lang="en-US" dirty="0"/>
           </a:p>
         </p:txBody>

</xml_diff>